<commit_message>
CAUSEWAY-3395: improves user guide
</commit_message>
<xml_diff>
--- a/antora/components/userguide/modules/ROOT/attachments/object-type-taxonomy.pptx
+++ b/antora/components/userguide/modules/ROOT/attachments/object-type-taxonomy.pptx
@@ -261,7 +261,7 @@
           <a:p>
             <a:fld id="{DA8F2445-9BCA-4445-AFEA-07BFD637959D}" type="datetimeFigureOut">
               <a:rPr lang="en-GB" smtClean="0"/>
-              <a:t>12/03/2023</a:t>
+              <a:t>20/06/2023</a:t>
             </a:fld>
             <a:endParaRPr lang="en-GB"/>
           </a:p>
@@ -461,7 +461,7 @@
           <a:p>
             <a:fld id="{DA8F2445-9BCA-4445-AFEA-07BFD637959D}" type="datetimeFigureOut">
               <a:rPr lang="en-GB" smtClean="0"/>
-              <a:t>12/03/2023</a:t>
+              <a:t>20/06/2023</a:t>
             </a:fld>
             <a:endParaRPr lang="en-GB"/>
           </a:p>
@@ -671,7 +671,7 @@
           <a:p>
             <a:fld id="{DA8F2445-9BCA-4445-AFEA-07BFD637959D}" type="datetimeFigureOut">
               <a:rPr lang="en-GB" smtClean="0"/>
-              <a:t>12/03/2023</a:t>
+              <a:t>20/06/2023</a:t>
             </a:fld>
             <a:endParaRPr lang="en-GB"/>
           </a:p>
@@ -871,7 +871,7 @@
           <a:p>
             <a:fld id="{DA8F2445-9BCA-4445-AFEA-07BFD637959D}" type="datetimeFigureOut">
               <a:rPr lang="en-GB" smtClean="0"/>
-              <a:t>12/03/2023</a:t>
+              <a:t>20/06/2023</a:t>
             </a:fld>
             <a:endParaRPr lang="en-GB"/>
           </a:p>
@@ -1147,7 +1147,7 @@
           <a:p>
             <a:fld id="{DA8F2445-9BCA-4445-AFEA-07BFD637959D}" type="datetimeFigureOut">
               <a:rPr lang="en-GB" smtClean="0"/>
-              <a:t>12/03/2023</a:t>
+              <a:t>20/06/2023</a:t>
             </a:fld>
             <a:endParaRPr lang="en-GB"/>
           </a:p>
@@ -1415,7 +1415,7 @@
           <a:p>
             <a:fld id="{DA8F2445-9BCA-4445-AFEA-07BFD637959D}" type="datetimeFigureOut">
               <a:rPr lang="en-GB" smtClean="0"/>
-              <a:t>12/03/2023</a:t>
+              <a:t>20/06/2023</a:t>
             </a:fld>
             <a:endParaRPr lang="en-GB"/>
           </a:p>
@@ -1830,7 +1830,7 @@
           <a:p>
             <a:fld id="{DA8F2445-9BCA-4445-AFEA-07BFD637959D}" type="datetimeFigureOut">
               <a:rPr lang="en-GB" smtClean="0"/>
-              <a:t>12/03/2023</a:t>
+              <a:t>20/06/2023</a:t>
             </a:fld>
             <a:endParaRPr lang="en-GB"/>
           </a:p>
@@ -1972,7 +1972,7 @@
           <a:p>
             <a:fld id="{DA8F2445-9BCA-4445-AFEA-07BFD637959D}" type="datetimeFigureOut">
               <a:rPr lang="en-GB" smtClean="0"/>
-              <a:t>12/03/2023</a:t>
+              <a:t>20/06/2023</a:t>
             </a:fld>
             <a:endParaRPr lang="en-GB"/>
           </a:p>
@@ -2085,7 +2085,7 @@
           <a:p>
             <a:fld id="{DA8F2445-9BCA-4445-AFEA-07BFD637959D}" type="datetimeFigureOut">
               <a:rPr lang="en-GB" smtClean="0"/>
-              <a:t>12/03/2023</a:t>
+              <a:t>20/06/2023</a:t>
             </a:fld>
             <a:endParaRPr lang="en-GB"/>
           </a:p>
@@ -2398,7 +2398,7 @@
           <a:p>
             <a:fld id="{DA8F2445-9BCA-4445-AFEA-07BFD637959D}" type="datetimeFigureOut">
               <a:rPr lang="en-GB" smtClean="0"/>
-              <a:t>12/03/2023</a:t>
+              <a:t>20/06/2023</a:t>
             </a:fld>
             <a:endParaRPr lang="en-GB"/>
           </a:p>
@@ -2687,7 +2687,7 @@
           <a:p>
             <a:fld id="{DA8F2445-9BCA-4445-AFEA-07BFD637959D}" type="datetimeFigureOut">
               <a:rPr lang="en-GB" smtClean="0"/>
-              <a:t>12/03/2023</a:t>
+              <a:t>20/06/2023</a:t>
             </a:fld>
             <a:endParaRPr lang="en-GB"/>
           </a:p>
@@ -2930,7 +2930,7 @@
           <a:p>
             <a:fld id="{DA8F2445-9BCA-4445-AFEA-07BFD637959D}" type="datetimeFigureOut">
               <a:rPr lang="en-GB" smtClean="0"/>
-              <a:t>12/03/2023</a:t>
+              <a:t>20/06/2023</a:t>
             </a:fld>
             <a:endParaRPr lang="en-GB"/>
           </a:p>
@@ -3575,7 +3575,7 @@
           </p:nvSpPr>
           <p:spPr>
             <a:xfrm>
-              <a:off x="7582717" y="1912117"/>
+              <a:off x="7525509" y="1720385"/>
               <a:ext cx="2267602" cy="591458"/>
             </a:xfrm>
             <a:prstGeom prst="rect">
@@ -3901,8 +3901,8 @@
           </p:nvSpPr>
           <p:spPr>
             <a:xfrm>
-              <a:off x="1973038" y="4209913"/>
-              <a:ext cx="2085082" cy="337976"/>
+              <a:off x="2028215" y="4458222"/>
+              <a:ext cx="2665965" cy="338554"/>
             </a:xfrm>
             <a:prstGeom prst="rect">
               <a:avLst/>
@@ -3916,12 +3916,8 @@
             <a:lstStyle/>
             <a:p>
               <a:r>
-                <a:rPr lang="en-GB" sz="1600" dirty="0"/>
-                <a:t>@</a:t>
-              </a:r>
-              <a:r>
-                <a:rPr lang="en-GB" sz="1600" dirty="0" err="1"/>
-                <a:t>PersistenceCapable</a:t>
+                <a:rPr lang="en-GB" sz="1600"/>
+                <a:t>@PersistenceCapable (jdo)</a:t>
               </a:r>
               <a:endParaRPr lang="en-GB" sz="1600" dirty="0"/>
             </a:p>
@@ -4296,7 +4292,7 @@
           </p:nvSpPr>
           <p:spPr>
             <a:xfrm>
-              <a:off x="3637191" y="5307992"/>
+              <a:off x="3515008" y="5280403"/>
               <a:ext cx="3355260" cy="506964"/>
             </a:xfrm>
             <a:prstGeom prst="rect">
@@ -4428,7 +4424,7 @@
           </p:nvSpPr>
           <p:spPr>
             <a:xfrm>
-              <a:off x="964172" y="1252195"/>
+              <a:off x="3144212" y="574524"/>
               <a:ext cx="1008866" cy="337976"/>
             </a:xfrm>
             <a:prstGeom prst="rect">
@@ -4541,6 +4537,78 @@
           </p:txBody>
         </p:sp>
       </p:grpSp>
+      <p:sp>
+        <p:nvSpPr>
+          <p:cNvPr id="2" name="TextBox 1">
+            <a:extLst>
+              <a:ext uri="{FF2B5EF4-FFF2-40B4-BE49-F238E27FC236}">
+                <a16:creationId xmlns:a16="http://schemas.microsoft.com/office/drawing/2014/main" id="{C2FFFD2C-FC31-6863-56E3-F873B1D64A0A}"/>
+              </a:ext>
+            </a:extLst>
+          </p:cNvPr>
+          <p:cNvSpPr txBox="1"/>
+          <p:nvPr/>
+        </p:nvSpPr>
+        <p:spPr>
+          <a:xfrm>
+            <a:off x="2030846" y="4165244"/>
+            <a:ext cx="2085082" cy="337976"/>
+          </a:xfrm>
+          <a:prstGeom prst="rect">
+            <a:avLst/>
+          </a:prstGeom>
+          <a:noFill/>
+        </p:spPr>
+        <p:txBody>
+          <a:bodyPr wrap="square" rtlCol="0">
+            <a:spAutoFit/>
+          </a:bodyPr>
+          <a:lstStyle/>
+          <a:p>
+            <a:r>
+              <a:rPr lang="en-GB" sz="1600"/>
+              <a:t>@Entity  (jpa)	</a:t>
+            </a:r>
+            <a:endParaRPr lang="en-GB" sz="1600" dirty="0"/>
+          </a:p>
+        </p:txBody>
+      </p:sp>
+      <p:sp>
+        <p:nvSpPr>
+          <p:cNvPr id="3" name="TextBox 2">
+            <a:extLst>
+              <a:ext uri="{FF2B5EF4-FFF2-40B4-BE49-F238E27FC236}">
+                <a16:creationId xmlns:a16="http://schemas.microsoft.com/office/drawing/2014/main" id="{0F61BB2E-A402-0CF0-BC8B-4D6E036B509F}"/>
+              </a:ext>
+            </a:extLst>
+          </p:cNvPr>
+          <p:cNvSpPr txBox="1"/>
+          <p:nvPr/>
+        </p:nvSpPr>
+        <p:spPr>
+          <a:xfrm>
+            <a:off x="5159927" y="3189524"/>
+            <a:ext cx="1430465" cy="337976"/>
+          </a:xfrm>
+          <a:prstGeom prst="rect">
+            <a:avLst/>
+          </a:prstGeom>
+          <a:noFill/>
+        </p:spPr>
+        <p:txBody>
+          <a:bodyPr wrap="square" rtlCol="0">
+            <a:spAutoFit/>
+          </a:bodyPr>
+          <a:lstStyle/>
+          <a:p>
+            <a:r>
+              <a:rPr lang="en-GB" sz="1600"/>
+              <a:t>@Value</a:t>
+            </a:r>
+            <a:endParaRPr lang="en-GB" sz="1600" dirty="0"/>
+          </a:p>
+        </p:txBody>
+      </p:sp>
     </p:spTree>
     <p:extLst>
       <p:ext uri="{BB962C8B-B14F-4D97-AF65-F5344CB8AC3E}">

</xml_diff>

<commit_message>
CAUSEWAY-3395: reworking user guide
</commit_message>
<xml_diff>
--- a/antora/components/userguide/modules/ROOT/attachments/object-type-taxonomy.pptx
+++ b/antora/components/userguide/modules/ROOT/attachments/object-type-taxonomy.pptx
@@ -261,7 +261,7 @@
           <a:p>
             <a:fld id="{DA8F2445-9BCA-4445-AFEA-07BFD637959D}" type="datetimeFigureOut">
               <a:rPr lang="en-GB" smtClean="0"/>
-              <a:t>20/06/2023</a:t>
+              <a:t>21/06/2023</a:t>
             </a:fld>
             <a:endParaRPr lang="en-GB"/>
           </a:p>
@@ -461,7 +461,7 @@
           <a:p>
             <a:fld id="{DA8F2445-9BCA-4445-AFEA-07BFD637959D}" type="datetimeFigureOut">
               <a:rPr lang="en-GB" smtClean="0"/>
-              <a:t>20/06/2023</a:t>
+              <a:t>21/06/2023</a:t>
             </a:fld>
             <a:endParaRPr lang="en-GB"/>
           </a:p>
@@ -671,7 +671,7 @@
           <a:p>
             <a:fld id="{DA8F2445-9BCA-4445-AFEA-07BFD637959D}" type="datetimeFigureOut">
               <a:rPr lang="en-GB" smtClean="0"/>
-              <a:t>20/06/2023</a:t>
+              <a:t>21/06/2023</a:t>
             </a:fld>
             <a:endParaRPr lang="en-GB"/>
           </a:p>
@@ -871,7 +871,7 @@
           <a:p>
             <a:fld id="{DA8F2445-9BCA-4445-AFEA-07BFD637959D}" type="datetimeFigureOut">
               <a:rPr lang="en-GB" smtClean="0"/>
-              <a:t>20/06/2023</a:t>
+              <a:t>21/06/2023</a:t>
             </a:fld>
             <a:endParaRPr lang="en-GB"/>
           </a:p>
@@ -1147,7 +1147,7 @@
           <a:p>
             <a:fld id="{DA8F2445-9BCA-4445-AFEA-07BFD637959D}" type="datetimeFigureOut">
               <a:rPr lang="en-GB" smtClean="0"/>
-              <a:t>20/06/2023</a:t>
+              <a:t>21/06/2023</a:t>
             </a:fld>
             <a:endParaRPr lang="en-GB"/>
           </a:p>
@@ -1415,7 +1415,7 @@
           <a:p>
             <a:fld id="{DA8F2445-9BCA-4445-AFEA-07BFD637959D}" type="datetimeFigureOut">
               <a:rPr lang="en-GB" smtClean="0"/>
-              <a:t>20/06/2023</a:t>
+              <a:t>21/06/2023</a:t>
             </a:fld>
             <a:endParaRPr lang="en-GB"/>
           </a:p>
@@ -1830,7 +1830,7 @@
           <a:p>
             <a:fld id="{DA8F2445-9BCA-4445-AFEA-07BFD637959D}" type="datetimeFigureOut">
               <a:rPr lang="en-GB" smtClean="0"/>
-              <a:t>20/06/2023</a:t>
+              <a:t>21/06/2023</a:t>
             </a:fld>
             <a:endParaRPr lang="en-GB"/>
           </a:p>
@@ -1972,7 +1972,7 @@
           <a:p>
             <a:fld id="{DA8F2445-9BCA-4445-AFEA-07BFD637959D}" type="datetimeFigureOut">
               <a:rPr lang="en-GB" smtClean="0"/>
-              <a:t>20/06/2023</a:t>
+              <a:t>21/06/2023</a:t>
             </a:fld>
             <a:endParaRPr lang="en-GB"/>
           </a:p>
@@ -2085,7 +2085,7 @@
           <a:p>
             <a:fld id="{DA8F2445-9BCA-4445-AFEA-07BFD637959D}" type="datetimeFigureOut">
               <a:rPr lang="en-GB" smtClean="0"/>
-              <a:t>20/06/2023</a:t>
+              <a:t>21/06/2023</a:t>
             </a:fld>
             <a:endParaRPr lang="en-GB"/>
           </a:p>
@@ -2398,7 +2398,7 @@
           <a:p>
             <a:fld id="{DA8F2445-9BCA-4445-AFEA-07BFD637959D}" type="datetimeFigureOut">
               <a:rPr lang="en-GB" smtClean="0"/>
-              <a:t>20/06/2023</a:t>
+              <a:t>21/06/2023</a:t>
             </a:fld>
             <a:endParaRPr lang="en-GB"/>
           </a:p>
@@ -2687,7 +2687,7 @@
           <a:p>
             <a:fld id="{DA8F2445-9BCA-4445-AFEA-07BFD637959D}" type="datetimeFigureOut">
               <a:rPr lang="en-GB" smtClean="0"/>
-              <a:t>20/06/2023</a:t>
+              <a:t>21/06/2023</a:t>
             </a:fld>
             <a:endParaRPr lang="en-GB"/>
           </a:p>
@@ -2930,7 +2930,7 @@
           <a:p>
             <a:fld id="{DA8F2445-9BCA-4445-AFEA-07BFD637959D}" type="datetimeFigureOut">
               <a:rPr lang="en-GB" smtClean="0"/>
-              <a:t>20/06/2023</a:t>
+              <a:t>21/06/2023</a:t>
             </a:fld>
             <a:endParaRPr lang="en-GB"/>
           </a:p>
@@ -3361,10 +3361,10 @@
         </p:nvGrpSpPr>
         <p:grpSpPr>
           <a:xfrm>
-            <a:off x="580296" y="131887"/>
-            <a:ext cx="11523603" cy="6633797"/>
+            <a:off x="580296" y="92473"/>
+            <a:ext cx="10316311" cy="6633797"/>
             <a:chOff x="580296" y="131887"/>
-            <a:chExt cx="11523603" cy="6633797"/>
+            <a:chExt cx="10316311" cy="6633797"/>
           </a:xfrm>
         </p:grpSpPr>
         <p:sp>
@@ -3937,7 +3937,7 @@
           </p:nvSpPr>
           <p:spPr>
             <a:xfrm>
-              <a:off x="5597015" y="5266790"/>
+              <a:off x="5636428" y="5385032"/>
               <a:ext cx="3355260" cy="337976"/>
             </a:xfrm>
             <a:prstGeom prst="rect">
@@ -3980,8 +3980,8 @@
           </p:nvSpPr>
           <p:spPr>
             <a:xfrm>
-              <a:off x="6052960" y="4983845"/>
-              <a:ext cx="3355260" cy="337976"/>
+              <a:off x="5532696" y="5125736"/>
+              <a:ext cx="3355260" cy="338554"/>
             </a:xfrm>
             <a:prstGeom prst="rect">
               <a:avLst/>
@@ -3995,12 +3995,8 @@
             <a:lstStyle/>
             <a:p>
               <a:r>
-                <a:rPr lang="en-GB" sz="1600" dirty="0"/>
-                <a:t>@</a:t>
-              </a:r>
-              <a:r>
-                <a:rPr lang="en-GB" sz="1600" dirty="0" err="1"/>
-                <a:t>Mixin</a:t>
+                <a:rPr lang="en-GB" sz="1600"/>
+                <a:t>@Action, @Property, @Collection</a:t>
               </a:r>
               <a:endParaRPr lang="en-GB" sz="1600" dirty="0"/>
             </a:p>
@@ -4459,83 +4455,6 @@
             </a:p>
           </p:txBody>
         </p:sp>
-        <p:sp>
-          <p:nvSpPr>
-            <p:cNvPr id="45" name="TextBox 44">
-              <a:extLst>
-                <a:ext uri="{FF2B5EF4-FFF2-40B4-BE49-F238E27FC236}">
-                  <a16:creationId xmlns:a16="http://schemas.microsoft.com/office/drawing/2014/main" id="{BF607577-2E96-4A71-9301-A561509AFF44}"/>
-                </a:ext>
-              </a:extLst>
-            </p:cNvPr>
-            <p:cNvSpPr txBox="1"/>
-            <p:nvPr/>
-          </p:nvSpPr>
-          <p:spPr>
-            <a:xfrm>
-              <a:off x="9334558" y="5814079"/>
-              <a:ext cx="2769341" cy="923330"/>
-            </a:xfrm>
-            <a:prstGeom prst="rect">
-              <a:avLst/>
-            </a:prstGeom>
-            <a:noFill/>
-          </p:spPr>
-          <p:txBody>
-            <a:bodyPr wrap="square" rtlCol="0">
-              <a:spAutoFit/>
-            </a:bodyPr>
-            <a:lstStyle/>
-            <a:p>
-              <a:r>
-                <a:rPr lang="en-GB" sz="1200" dirty="0"/>
-                <a:t>Domain types can be both </a:t>
-              </a:r>
-              <a:r>
-                <a:rPr lang="en-GB" sz="1200" dirty="0" err="1"/>
-                <a:t>mixins</a:t>
-              </a:r>
-              <a:r>
-                <a:rPr lang="en-GB" sz="1200" dirty="0"/>
-                <a:t> &amp; view models (@</a:t>
-              </a:r>
-              <a:r>
-                <a:rPr lang="en-GB" sz="1200" dirty="0" err="1"/>
-                <a:t>Mixin</a:t>
-              </a:r>
-              <a:r>
-                <a:rPr lang="en-GB" sz="1200" dirty="0"/>
-                <a:t> + @</a:t>
-              </a:r>
-              <a:r>
-                <a:rPr lang="en-GB" sz="1200" dirty="0" err="1"/>
-                <a:t>XmlRootElement</a:t>
-              </a:r>
-              <a:r>
-                <a:rPr lang="en-GB" sz="1200" dirty="0"/>
-                <a:t>)</a:t>
-              </a:r>
-              <a:br>
-                <a:rPr lang="en-GB" sz="1200" dirty="0"/>
-              </a:br>
-              <a:endParaRPr lang="en-GB" sz="600" dirty="0"/>
-            </a:p>
-            <a:p>
-              <a:r>
-                <a:rPr lang="en-GB" sz="1200" dirty="0"/>
-                <a:t>Entities cannot be combined (cannot also be a </a:t>
-              </a:r>
-              <a:r>
-                <a:rPr lang="en-GB" sz="1200" dirty="0" err="1"/>
-                <a:t>mixin</a:t>
-              </a:r>
-              <a:r>
-                <a:rPr lang="en-GB" sz="1200" dirty="0"/>
-                <a:t> nor a view model)</a:t>
-              </a:r>
-            </a:p>
-          </p:txBody>
-        </p:sp>
       </p:grpSp>
       <p:sp>
         <p:nvSpPr>
@@ -4587,7 +4506,7 @@
         </p:nvSpPr>
         <p:spPr>
           <a:xfrm>
-            <a:off x="5159927" y="3189524"/>
+            <a:off x="5085041" y="3098873"/>
             <a:ext cx="1430465" cy="337976"/>
           </a:xfrm>
           <a:prstGeom prst="rect">

</xml_diff>